<commit_message>
Updated logo and mini-tutorials
</commit_message>
<xml_diff>
--- a/doc/logo/logo.pptx
+++ b/doc/logo/logo.pptx
@@ -5,10 +5,11 @@
     <p:sldMasterId id="2147483648" r:id="rId1"/>
   </p:sldMasterIdLst>
   <p:notesMasterIdLst>
-    <p:notesMasterId r:id="rId3"/>
+    <p:notesMasterId r:id="rId4"/>
   </p:notesMasterIdLst>
   <p:sldIdLst>
     <p:sldId id="270" r:id="rId2"/>
+    <p:sldId id="271" r:id="rId3"/>
   </p:sldIdLst>
   <p:sldSz cx="12192000" cy="6858000"/>
   <p:notesSz cx="6858000" cy="9144000"/>
@@ -196,7 +197,7 @@
           </a:lstStyle>
           <a:p>
             <a:fld id="{49500105-9C48-984E-9CDC-F1375D25D7E6}" type="datetimeFigureOut">
-              <a:t>03/07/2025</a:t>
+              <a:t>08/07/2025</a:t>
             </a:fld>
             <a:endParaRPr lang="fr-FR"/>
           </a:p>
@@ -608,7 +609,7 @@
           <a:lstStyle/>
           <a:p>
             <a:fld id="{7017F4CF-FB7D-E643-B991-A4BE8CDC438F}" type="datetimeFigureOut">
-              <a:t>03/07/2025</a:t>
+              <a:t>08/07/2025</a:t>
             </a:fld>
             <a:endParaRPr lang="fr-FR"/>
           </a:p>
@@ -804,7 +805,7 @@
           <a:lstStyle/>
           <a:p>
             <a:fld id="{7017F4CF-FB7D-E643-B991-A4BE8CDC438F}" type="datetimeFigureOut">
-              <a:t>03/07/2025</a:t>
+              <a:t>08/07/2025</a:t>
             </a:fld>
             <a:endParaRPr lang="fr-FR"/>
           </a:p>
@@ -1010,7 +1011,7 @@
           <a:lstStyle/>
           <a:p>
             <a:fld id="{7017F4CF-FB7D-E643-B991-A4BE8CDC438F}" type="datetimeFigureOut">
-              <a:t>03/07/2025</a:t>
+              <a:t>08/07/2025</a:t>
             </a:fld>
             <a:endParaRPr lang="fr-FR"/>
           </a:p>
@@ -1206,7 +1207,7 @@
           <a:lstStyle/>
           <a:p>
             <a:fld id="{7017F4CF-FB7D-E643-B991-A4BE8CDC438F}" type="datetimeFigureOut">
-              <a:t>03/07/2025</a:t>
+              <a:t>08/07/2025</a:t>
             </a:fld>
             <a:endParaRPr lang="fr-FR"/>
           </a:p>
@@ -1479,7 +1480,7 @@
           <a:lstStyle/>
           <a:p>
             <a:fld id="{7017F4CF-FB7D-E643-B991-A4BE8CDC438F}" type="datetimeFigureOut">
-              <a:t>03/07/2025</a:t>
+              <a:t>08/07/2025</a:t>
             </a:fld>
             <a:endParaRPr lang="fr-FR"/>
           </a:p>
@@ -1742,7 +1743,7 @@
           <a:lstStyle/>
           <a:p>
             <a:fld id="{7017F4CF-FB7D-E643-B991-A4BE8CDC438F}" type="datetimeFigureOut">
-              <a:t>03/07/2025</a:t>
+              <a:t>08/07/2025</a:t>
             </a:fld>
             <a:endParaRPr lang="fr-FR"/>
           </a:p>
@@ -2152,7 +2153,7 @@
           <a:lstStyle/>
           <a:p>
             <a:fld id="{7017F4CF-FB7D-E643-B991-A4BE8CDC438F}" type="datetimeFigureOut">
-              <a:t>03/07/2025</a:t>
+              <a:t>08/07/2025</a:t>
             </a:fld>
             <a:endParaRPr lang="fr-FR"/>
           </a:p>
@@ -2291,7 +2292,7 @@
           <a:lstStyle/>
           <a:p>
             <a:fld id="{7017F4CF-FB7D-E643-B991-A4BE8CDC438F}" type="datetimeFigureOut">
-              <a:t>03/07/2025</a:t>
+              <a:t>08/07/2025</a:t>
             </a:fld>
             <a:endParaRPr lang="fr-FR"/>
           </a:p>
@@ -2402,7 +2403,7 @@
           <a:lstStyle/>
           <a:p>
             <a:fld id="{7017F4CF-FB7D-E643-B991-A4BE8CDC438F}" type="datetimeFigureOut">
-              <a:t>03/07/2025</a:t>
+              <a:t>08/07/2025</a:t>
             </a:fld>
             <a:endParaRPr lang="fr-FR"/>
           </a:p>
@@ -2711,7 +2712,7 @@
           <a:lstStyle/>
           <a:p>
             <a:fld id="{7017F4CF-FB7D-E643-B991-A4BE8CDC438F}" type="datetimeFigureOut">
-              <a:t>03/07/2025</a:t>
+              <a:t>08/07/2025</a:t>
             </a:fld>
             <a:endParaRPr lang="fr-FR"/>
           </a:p>
@@ -2997,7 +2998,7 @@
           <a:lstStyle/>
           <a:p>
             <a:fld id="{7017F4CF-FB7D-E643-B991-A4BE8CDC438F}" type="datetimeFigureOut">
-              <a:t>03/07/2025</a:t>
+              <a:t>08/07/2025</a:t>
             </a:fld>
             <a:endParaRPr lang="fr-FR"/>
           </a:p>
@@ -3236,7 +3237,7 @@
           </a:lstStyle>
           <a:p>
             <a:fld id="{7017F4CF-FB7D-E643-B991-A4BE8CDC438F}" type="datetimeFigureOut">
-              <a:t>03/07/2025</a:t>
+              <a:t>08/07/2025</a:t>
             </a:fld>
             <a:endParaRPr lang="fr-FR"/>
           </a:p>
@@ -3779,6 +3780,72 @@
     <p:extLst>
       <p:ext uri="{BB962C8B-B14F-4D97-AF65-F5344CB8AC3E}">
         <p14:creationId xmlns:p14="http://schemas.microsoft.com/office/powerpoint/2010/main" val="666868872"/>
+      </p:ext>
+    </p:extLst>
+  </p:cSld>
+  <p:clrMapOvr>
+    <a:masterClrMapping/>
+  </p:clrMapOvr>
+</p:sld>
+</file>
+
+<file path=ppt/slides/slide2.xml><?xml version="1.0" encoding="utf-8"?>
+<p:sld xmlns:a="http://schemas.openxmlformats.org/drawingml/2006/main" xmlns:r="http://schemas.openxmlformats.org/officeDocument/2006/relationships" xmlns:p="http://schemas.openxmlformats.org/presentationml/2006/main">
+  <p:cSld>
+    <p:spTree>
+      <p:nvGrpSpPr>
+        <p:cNvPr id="1" name="">
+          <a:extLst>
+            <a:ext uri="{FF2B5EF4-FFF2-40B4-BE49-F238E27FC236}">
+              <a16:creationId xmlns:a16="http://schemas.microsoft.com/office/drawing/2014/main" id="{845EA0AA-6B19-DEDB-0085-549F4718EC44}"/>
+            </a:ext>
+          </a:extLst>
+        </p:cNvPr>
+        <p:cNvGrpSpPr/>
+        <p:nvPr/>
+      </p:nvGrpSpPr>
+      <p:grpSpPr>
+        <a:xfrm>
+          <a:off x="0" y="0"/>
+          <a:ext cx="0" cy="0"/>
+          <a:chOff x="0" y="0"/>
+          <a:chExt cx="0" cy="0"/>
+        </a:xfrm>
+      </p:grpSpPr>
+      <p:pic>
+        <p:nvPicPr>
+          <p:cNvPr id="4" name="Image 3" descr="Une image contenant Police, Graphique, graphisme, logo&#10;&#10;Le contenu généré par l’IA peut être incorrect.">
+            <a:extLst>
+              <a:ext uri="{FF2B5EF4-FFF2-40B4-BE49-F238E27FC236}">
+                <a16:creationId xmlns:a16="http://schemas.microsoft.com/office/drawing/2014/main" id="{A202A88F-227F-C374-912B-43DA605E1A72}"/>
+              </a:ext>
+            </a:extLst>
+          </p:cNvPr>
+          <p:cNvPicPr>
+            <a:picLocks noChangeAspect="1"/>
+          </p:cNvPicPr>
+          <p:nvPr/>
+        </p:nvPicPr>
+        <p:blipFill>
+          <a:blip r:embed="rId2"/>
+          <a:stretch>
+            <a:fillRect/>
+          </a:stretch>
+        </p:blipFill>
+        <p:spPr>
+          <a:xfrm>
+            <a:off x="2667000" y="2178050"/>
+            <a:ext cx="6858000" cy="2501900"/>
+          </a:xfrm>
+          <a:prstGeom prst="rect">
+            <a:avLst/>
+          </a:prstGeom>
+        </p:spPr>
+      </p:pic>
+    </p:spTree>
+    <p:extLst>
+      <p:ext uri="{BB962C8B-B14F-4D97-AF65-F5344CB8AC3E}">
+        <p14:creationId xmlns:p14="http://schemas.microsoft.com/office/powerpoint/2010/main" val="2334209159"/>
       </p:ext>
     </p:extLst>
   </p:cSld>

</xml_diff>

<commit_message>
Updated logo and Github social media picture
</commit_message>
<xml_diff>
--- a/doc/logo/logo.pptx
+++ b/doc/logo/logo.pptx
@@ -9,7 +9,7 @@
   </p:notesMasterIdLst>
   <p:sldIdLst>
     <p:sldId id="270" r:id="rId2"/>
-    <p:sldId id="271" r:id="rId3"/>
+    <p:sldId id="273" r:id="rId3"/>
   </p:sldIdLst>
   <p:sldSz cx="12192000" cy="6858000"/>
   <p:notesSz cx="6858000" cy="9144000"/>
@@ -197,7 +197,7 @@
           </a:lstStyle>
           <a:p>
             <a:fld id="{49500105-9C48-984E-9CDC-F1375D25D7E6}" type="datetimeFigureOut">
-              <a:t>08/07/2025</a:t>
+              <a:t>11/07/2025</a:t>
             </a:fld>
             <a:endParaRPr lang="fr-FR"/>
           </a:p>
@@ -609,7 +609,7 @@
           <a:lstStyle/>
           <a:p>
             <a:fld id="{7017F4CF-FB7D-E643-B991-A4BE8CDC438F}" type="datetimeFigureOut">
-              <a:t>08/07/2025</a:t>
+              <a:t>11/07/2025</a:t>
             </a:fld>
             <a:endParaRPr lang="fr-FR"/>
           </a:p>
@@ -805,7 +805,7 @@
           <a:lstStyle/>
           <a:p>
             <a:fld id="{7017F4CF-FB7D-E643-B991-A4BE8CDC438F}" type="datetimeFigureOut">
-              <a:t>08/07/2025</a:t>
+              <a:t>11/07/2025</a:t>
             </a:fld>
             <a:endParaRPr lang="fr-FR"/>
           </a:p>
@@ -1011,7 +1011,7 @@
           <a:lstStyle/>
           <a:p>
             <a:fld id="{7017F4CF-FB7D-E643-B991-A4BE8CDC438F}" type="datetimeFigureOut">
-              <a:t>08/07/2025</a:t>
+              <a:t>11/07/2025</a:t>
             </a:fld>
             <a:endParaRPr lang="fr-FR"/>
           </a:p>
@@ -1207,7 +1207,7 @@
           <a:lstStyle/>
           <a:p>
             <a:fld id="{7017F4CF-FB7D-E643-B991-A4BE8CDC438F}" type="datetimeFigureOut">
-              <a:t>08/07/2025</a:t>
+              <a:t>11/07/2025</a:t>
             </a:fld>
             <a:endParaRPr lang="fr-FR"/>
           </a:p>
@@ -1480,7 +1480,7 @@
           <a:lstStyle/>
           <a:p>
             <a:fld id="{7017F4CF-FB7D-E643-B991-A4BE8CDC438F}" type="datetimeFigureOut">
-              <a:t>08/07/2025</a:t>
+              <a:t>11/07/2025</a:t>
             </a:fld>
             <a:endParaRPr lang="fr-FR"/>
           </a:p>
@@ -1743,7 +1743,7 @@
           <a:lstStyle/>
           <a:p>
             <a:fld id="{7017F4CF-FB7D-E643-B991-A4BE8CDC438F}" type="datetimeFigureOut">
-              <a:t>08/07/2025</a:t>
+              <a:t>11/07/2025</a:t>
             </a:fld>
             <a:endParaRPr lang="fr-FR"/>
           </a:p>
@@ -2153,7 +2153,7 @@
           <a:lstStyle/>
           <a:p>
             <a:fld id="{7017F4CF-FB7D-E643-B991-A4BE8CDC438F}" type="datetimeFigureOut">
-              <a:t>08/07/2025</a:t>
+              <a:t>11/07/2025</a:t>
             </a:fld>
             <a:endParaRPr lang="fr-FR"/>
           </a:p>
@@ -2292,7 +2292,7 @@
           <a:lstStyle/>
           <a:p>
             <a:fld id="{7017F4CF-FB7D-E643-B991-A4BE8CDC438F}" type="datetimeFigureOut">
-              <a:t>08/07/2025</a:t>
+              <a:t>11/07/2025</a:t>
             </a:fld>
             <a:endParaRPr lang="fr-FR"/>
           </a:p>
@@ -2403,7 +2403,7 @@
           <a:lstStyle/>
           <a:p>
             <a:fld id="{7017F4CF-FB7D-E643-B991-A4BE8CDC438F}" type="datetimeFigureOut">
-              <a:t>08/07/2025</a:t>
+              <a:t>11/07/2025</a:t>
             </a:fld>
             <a:endParaRPr lang="fr-FR"/>
           </a:p>
@@ -2712,7 +2712,7 @@
           <a:lstStyle/>
           <a:p>
             <a:fld id="{7017F4CF-FB7D-E643-B991-A4BE8CDC438F}" type="datetimeFigureOut">
-              <a:t>08/07/2025</a:t>
+              <a:t>11/07/2025</a:t>
             </a:fld>
             <a:endParaRPr lang="fr-FR"/>
           </a:p>
@@ -2998,7 +2998,7 @@
           <a:lstStyle/>
           <a:p>
             <a:fld id="{7017F4CF-FB7D-E643-B991-A4BE8CDC438F}" type="datetimeFigureOut">
-              <a:t>08/07/2025</a:t>
+              <a:t>11/07/2025</a:t>
             </a:fld>
             <a:endParaRPr lang="fr-FR"/>
           </a:p>
@@ -3237,7 +3237,7 @@
           </a:lstStyle>
           <a:p>
             <a:fld id="{7017F4CF-FB7D-E643-B991-A4BE8CDC438F}" type="datetimeFigureOut">
-              <a:t>08/07/2025</a:t>
+              <a:t>11/07/2025</a:t>
             </a:fld>
             <a:endParaRPr lang="fr-FR"/>
           </a:p>
@@ -3797,7 +3797,7 @@
         <p:cNvPr id="1" name="">
           <a:extLst>
             <a:ext uri="{FF2B5EF4-FFF2-40B4-BE49-F238E27FC236}">
-              <a16:creationId xmlns:a16="http://schemas.microsoft.com/office/drawing/2014/main" id="{845EA0AA-6B19-DEDB-0085-549F4718EC44}"/>
+              <a16:creationId xmlns:a16="http://schemas.microsoft.com/office/drawing/2014/main" id="{50142EFA-4035-BD87-E371-EC3C65384F05}"/>
             </a:ext>
           </a:extLst>
         </p:cNvPr>
@@ -3812,40 +3812,116 @@
           <a:chExt cx="0" cy="0"/>
         </a:xfrm>
       </p:grpSpPr>
-      <p:pic>
-        <p:nvPicPr>
-          <p:cNvPr id="4" name="Image 3" descr="Une image contenant Police, Graphique, graphisme, logo&#10;&#10;Le contenu généré par l’IA peut être incorrect.">
-            <a:extLst>
-              <a:ext uri="{FF2B5EF4-FFF2-40B4-BE49-F238E27FC236}">
-                <a16:creationId xmlns:a16="http://schemas.microsoft.com/office/drawing/2014/main" id="{A202A88F-227F-C374-912B-43DA605E1A72}"/>
-              </a:ext>
-            </a:extLst>
-          </p:cNvPr>
-          <p:cNvPicPr>
-            <a:picLocks noChangeAspect="1"/>
-          </p:cNvPicPr>
+      <p:grpSp>
+        <p:nvGrpSpPr>
+          <p:cNvPr id="4" name="Groupe 3">
+            <a:extLst>
+              <a:ext uri="{FF2B5EF4-FFF2-40B4-BE49-F238E27FC236}">
+                <a16:creationId xmlns:a16="http://schemas.microsoft.com/office/drawing/2014/main" id="{025BDD72-856E-AFD0-306B-824407A326A4}"/>
+              </a:ext>
+            </a:extLst>
+          </p:cNvPr>
+          <p:cNvGrpSpPr/>
           <p:nvPr/>
-        </p:nvPicPr>
-        <p:blipFill>
-          <a:blip r:embed="rId2"/>
-          <a:stretch>
-            <a:fillRect/>
-          </a:stretch>
-        </p:blipFill>
-        <p:spPr>
+        </p:nvGrpSpPr>
+        <p:grpSpPr>
           <a:xfrm>
-            <a:off x="2667000" y="2178050"/>
-            <a:ext cx="6858000" cy="2501900"/>
+            <a:off x="4478993" y="2962907"/>
+            <a:ext cx="3234013" cy="932186"/>
+            <a:chOff x="4593628" y="3044279"/>
+            <a:chExt cx="3234013" cy="932186"/>
           </a:xfrm>
-          <a:prstGeom prst="rect">
-            <a:avLst/>
-          </a:prstGeom>
-        </p:spPr>
-      </p:pic>
+        </p:grpSpPr>
+        <p:sp>
+          <p:nvSpPr>
+            <p:cNvPr id="11" name="ZoneTexte 10">
+              <a:extLst>
+                <a:ext uri="{FF2B5EF4-FFF2-40B4-BE49-F238E27FC236}">
+                  <a16:creationId xmlns:a16="http://schemas.microsoft.com/office/drawing/2014/main" id="{FBE4FFCF-66D4-4CA2-8873-4CB08FBB311B}"/>
+                </a:ext>
+              </a:extLst>
+            </p:cNvPr>
+            <p:cNvSpPr txBox="1"/>
+            <p:nvPr/>
+          </p:nvSpPr>
+          <p:spPr>
+            <a:xfrm>
+              <a:off x="4593628" y="3044279"/>
+              <a:ext cx="2332690" cy="769441"/>
+            </a:xfrm>
+            <a:prstGeom prst="rect">
+              <a:avLst/>
+            </a:prstGeom>
+            <a:noFill/>
+          </p:spPr>
+          <p:txBody>
+            <a:bodyPr wrap="none" rtlCol="0">
+              <a:spAutoFit/>
+            </a:bodyPr>
+            <a:lstStyle/>
+            <a:p>
+              <a:pPr algn="ctr"/>
+              <a:r>
+                <a:rPr lang="fr-FR" sz="4400" b="1">
+                  <a:solidFill>
+                    <a:srgbClr val="105E9C"/>
+                  </a:solidFill>
+                  <a:latin typeface="Arial Rounded MT Bold" panose="020F0704030504030204" pitchFamily="34" charset="77"/>
+                  <a:cs typeface="Aharoni" panose="020F0502020204030204" pitchFamily="34" charset="0"/>
+                </a:rPr>
+                <a:t>gbacpp</a:t>
+              </a:r>
+            </a:p>
+          </p:txBody>
+        </p:sp>
+        <p:pic>
+          <p:nvPicPr>
+            <p:cNvPr id="3" name="Image 2" descr="Une image contenant Police, Graphique, graphisme, logo&#10;&#10;Le contenu généré par l’IA peut être incorrect.">
+              <a:extLst>
+                <a:ext uri="{FF2B5EF4-FFF2-40B4-BE49-F238E27FC236}">
+                  <a16:creationId xmlns:a16="http://schemas.microsoft.com/office/drawing/2014/main" id="{59626BFD-FE17-3915-7CF9-7B1F33407F7D}"/>
+                </a:ext>
+              </a:extLst>
+            </p:cNvPr>
+            <p:cNvPicPr>
+              <a:picLocks noChangeAspect="1"/>
+            </p:cNvPicPr>
+            <p:nvPr/>
+          </p:nvPicPr>
+          <p:blipFill>
+            <a:blip r:embed="rId2">
+              <a:extLst>
+                <a:ext uri="{BEBA8EAE-BF5A-486C-A8C5-ECC9F3942E4B}">
+                  <a14:imgProps xmlns:a14="http://schemas.microsoft.com/office/drawing/2010/main">
+                    <a14:imgLayer r:embed="rId3">
+                      <a14:imgEffect>
+                        <a14:colorTemperature colorTemp="5300"/>
+                      </a14:imgEffect>
+                    </a14:imgLayer>
+                  </a14:imgProps>
+                </a:ext>
+              </a:extLst>
+            </a:blip>
+            <a:srcRect l="73852" t="20558" r="2593" b="15685"/>
+            <a:stretch>
+              <a:fillRect/>
+            </a:stretch>
+          </p:blipFill>
+          <p:spPr>
+            <a:xfrm>
+              <a:off x="6926318" y="3086480"/>
+              <a:ext cx="901323" cy="889985"/>
+            </a:xfrm>
+            <a:prstGeom prst="rect">
+              <a:avLst/>
+            </a:prstGeom>
+          </p:spPr>
+        </p:pic>
+      </p:grpSp>
     </p:spTree>
     <p:extLst>
       <p:ext uri="{BB962C8B-B14F-4D97-AF65-F5344CB8AC3E}">
-        <p14:creationId xmlns:p14="http://schemas.microsoft.com/office/powerpoint/2010/main" val="2334209159"/>
+        <p14:creationId xmlns:p14="http://schemas.microsoft.com/office/powerpoint/2010/main" val="4223605415"/>
       </p:ext>
     </p:extLst>
   </p:cSld>

</xml_diff>